<commit_message>
feat : change js implementation
</commit_message>
<xml_diff>
--- a/Prez OIDC.pptx
+++ b/Prez OIDC.pptx
@@ -214,7 +214,7 @@
           <a:p>
             <a:fld id="{CEAEE7E3-3747-4852-9FFD-BE8C94A3E538}" type="datetimeFigureOut">
               <a:rPr lang="fr-FR" smtClean="0"/>
-              <a:t>02/07/2018</a:t>
+              <a:t>04/07/2018</a:t>
             </a:fld>
             <a:endParaRPr lang="fr-FR"/>
           </a:p>
@@ -3615,7 +3615,7 @@
           <a:p>
             <a:fld id="{F5DE3747-A71A-4323-B182-59653B97B97C}" type="datetimeFigureOut">
               <a:rPr lang="fr-FR" smtClean="0"/>
-              <a:t>02/07/2018</a:t>
+              <a:t>04/07/2018</a:t>
             </a:fld>
             <a:endParaRPr lang="fr-FR"/>
           </a:p>
@@ -3853,7 +3853,7 @@
           <a:p>
             <a:fld id="{F5DE3747-A71A-4323-B182-59653B97B97C}" type="datetimeFigureOut">
               <a:rPr lang="fr-FR" smtClean="0"/>
-              <a:t>02/07/2018</a:t>
+              <a:t>04/07/2018</a:t>
             </a:fld>
             <a:endParaRPr lang="fr-FR"/>
           </a:p>
@@ -4033,7 +4033,7 @@
           <a:p>
             <a:fld id="{F5DE3747-A71A-4323-B182-59653B97B97C}" type="datetimeFigureOut">
               <a:rPr lang="fr-FR" smtClean="0"/>
-              <a:t>02/07/2018</a:t>
+              <a:t>04/07/2018</a:t>
             </a:fld>
             <a:endParaRPr lang="fr-FR"/>
           </a:p>
@@ -4203,7 +4203,7 @@
           <a:p>
             <a:fld id="{F5DE3747-A71A-4323-B182-59653B97B97C}" type="datetimeFigureOut">
               <a:rPr lang="fr-FR" smtClean="0"/>
-              <a:t>02/07/2018</a:t>
+              <a:t>04/07/2018</a:t>
             </a:fld>
             <a:endParaRPr lang="fr-FR"/>
           </a:p>
@@ -4479,7 +4479,7 @@
           <a:p>
             <a:fld id="{F5DE3747-A71A-4323-B182-59653B97B97C}" type="datetimeFigureOut">
               <a:rPr lang="fr-FR" smtClean="0"/>
-              <a:t>02/07/2018</a:t>
+              <a:t>04/07/2018</a:t>
             </a:fld>
             <a:endParaRPr lang="fr-FR"/>
           </a:p>
@@ -5680,7 +5680,7 @@
           <a:p>
             <a:fld id="{F5DE3747-A71A-4323-B182-59653B97B97C}" type="datetimeFigureOut">
               <a:rPr lang="fr-FR" smtClean="0"/>
-              <a:t>02/07/2018</a:t>
+              <a:t>04/07/2018</a:t>
             </a:fld>
             <a:endParaRPr lang="fr-FR"/>
           </a:p>
@@ -6070,7 +6070,7 @@
           <a:p>
             <a:fld id="{F5DE3747-A71A-4323-B182-59653B97B97C}" type="datetimeFigureOut">
               <a:rPr lang="fr-FR" smtClean="0"/>
-              <a:t>02/07/2018</a:t>
+              <a:t>04/07/2018</a:t>
             </a:fld>
             <a:endParaRPr lang="fr-FR"/>
           </a:p>
@@ -6193,7 +6193,7 @@
           <a:p>
             <a:fld id="{F5DE3747-A71A-4323-B182-59653B97B97C}" type="datetimeFigureOut">
               <a:rPr lang="fr-FR" smtClean="0"/>
-              <a:t>02/07/2018</a:t>
+              <a:t>04/07/2018</a:t>
             </a:fld>
             <a:endParaRPr lang="fr-FR"/>
           </a:p>
@@ -6288,7 +6288,7 @@
           <a:p>
             <a:fld id="{F5DE3747-A71A-4323-B182-59653B97B97C}" type="datetimeFigureOut">
               <a:rPr lang="fr-FR" smtClean="0"/>
-              <a:t>02/07/2018</a:t>
+              <a:t>04/07/2018</a:t>
             </a:fld>
             <a:endParaRPr lang="fr-FR"/>
           </a:p>
@@ -7051,7 +7051,7 @@
           <a:p>
             <a:fld id="{F5DE3747-A71A-4323-B182-59653B97B97C}" type="datetimeFigureOut">
               <a:rPr lang="fr-FR" smtClean="0"/>
-              <a:t>02/07/2018</a:t>
+              <a:t>04/07/2018</a:t>
             </a:fld>
             <a:endParaRPr lang="fr-FR"/>
           </a:p>
@@ -7891,7 +7891,7 @@
           <a:p>
             <a:fld id="{F5DE3747-A71A-4323-B182-59653B97B97C}" type="datetimeFigureOut">
               <a:rPr lang="fr-FR" smtClean="0"/>
-              <a:t>02/07/2018</a:t>
+              <a:t>04/07/2018</a:t>
             </a:fld>
             <a:endParaRPr lang="fr-FR"/>
           </a:p>
@@ -8118,7 +8118,7 @@
           <a:p>
             <a:fld id="{F5DE3747-A71A-4323-B182-59653B97B97C}" type="datetimeFigureOut">
               <a:rPr lang="fr-FR" smtClean="0"/>
-              <a:t>02/07/2018</a:t>
+              <a:t>04/07/2018</a:t>
             </a:fld>
             <a:endParaRPr lang="fr-FR"/>
           </a:p>
@@ -9361,6 +9361,13 @@
               <a:t>Facebook</a:t>
             </a:r>
           </a:p>
+          <a:p>
+            <a:r>
+              <a:rPr lang="fr-FR"/>
+              <a:t>Github</a:t>
+            </a:r>
+            <a:endParaRPr lang="fr-FR" dirty="0"/>
+          </a:p>
         </p:txBody>
       </p:sp>
     </p:spTree>
@@ -9672,6 +9679,67 @@
                                           <p:spTgt spid="3">
                                             <p:txEl>
                                               <p:pRg st="4" end="4"/>
+                                            </p:txEl>
+                                          </p:spTgt>
+                                        </p:tgtEl>
+                                      </p:cBhvr>
+                                    </p:animEffect>
+                                  </p:childTnLst>
+                                </p:cTn>
+                              </p:par>
+                            </p:childTnLst>
+                          </p:cTn>
+                        </p:par>
+                      </p:childTnLst>
+                    </p:cTn>
+                  </p:par>
+                  <p:par>
+                    <p:cTn id="28" fill="hold">
+                      <p:stCondLst>
+                        <p:cond delay="indefinite"/>
+                      </p:stCondLst>
+                      <p:childTnLst>
+                        <p:par>
+                          <p:cTn id="29" fill="hold">
+                            <p:stCondLst>
+                              <p:cond delay="0"/>
+                            </p:stCondLst>
+                            <p:childTnLst>
+                              <p:par>
+                                <p:cTn id="30" presetID="10" presetClass="entr" presetSubtype="0" fill="hold" grpId="0" nodeType="clickEffect">
+                                  <p:stCondLst>
+                                    <p:cond delay="0"/>
+                                  </p:stCondLst>
+                                  <p:childTnLst>
+                                    <p:set>
+                                      <p:cBhvr>
+                                        <p:cTn id="31" dur="1" fill="hold">
+                                          <p:stCondLst>
+                                            <p:cond delay="0"/>
+                                          </p:stCondLst>
+                                        </p:cTn>
+                                        <p:tgtEl>
+                                          <p:spTgt spid="3">
+                                            <p:txEl>
+                                              <p:pRg st="5" end="5"/>
+                                            </p:txEl>
+                                          </p:spTgt>
+                                        </p:tgtEl>
+                                        <p:attrNameLst>
+                                          <p:attrName>style.visibility</p:attrName>
+                                        </p:attrNameLst>
+                                      </p:cBhvr>
+                                      <p:to>
+                                        <p:strVal val="visible"/>
+                                      </p:to>
+                                    </p:set>
+                                    <p:animEffect transition="in" filter="fade">
+                                      <p:cBhvr>
+                                        <p:cTn id="32" dur="500"/>
+                                        <p:tgtEl>
+                                          <p:spTgt spid="3">
+                                            <p:txEl>
+                                              <p:pRg st="5" end="5"/>
                                             </p:txEl>
                                           </p:spTgt>
                                         </p:tgtEl>

</xml_diff>

<commit_message>
refactor: Adjust wording in slides
</commit_message>
<xml_diff>
--- a/Prez OIDC.pptx
+++ b/Prez OIDC.pptx
@@ -130,6 +130,10 @@
     </p:ext>
   </p:extLst>
 </p:presentation>
+</file>
+
+<file path=ppt/revisionInfo.xml><?xml version="1.0" encoding="utf-8"?>
+<p1510:revInfo xmlns:a="http://schemas.openxmlformats.org/drawingml/2006/main" xmlns:r="http://schemas.openxmlformats.org/officeDocument/2006/relationships" xmlns:p1510="http://schemas.microsoft.com/office/powerpoint/2015/10/main"/>
 </file>
 
 <file path=ppt/notesMasters/notesMaster1.xml><?xml version="1.0" encoding="utf-8"?>
@@ -11734,6 +11738,14 @@
             <a:r>
               <a:rPr lang="fr-FR" sz="1600" dirty="0" err="1"/>
               <a:t>token</a:t>
+            </a:r>
+            <a:r>
+              <a:rPr lang="fr-FR" sz="1600" dirty="0"/>
+              <a:t>/</a:t>
+            </a:r>
+            <a:r>
+              <a:rPr lang="fr-FR" sz="1600"/>
+              <a:t>id_token</a:t>
             </a:r>
             <a:endParaRPr lang="fr-FR" sz="1600" dirty="0"/>
           </a:p>

</xml_diff>

<commit_message>
refactor: Remove animation on OIDC Providers slide
</commit_message>
<xml_diff>
--- a/Prez OIDC.pptx
+++ b/Prez OIDC.pptx
@@ -218,7 +218,7 @@
           <a:p>
             <a:fld id="{CEAEE7E3-3747-4852-9FFD-BE8C94A3E538}" type="datetimeFigureOut">
               <a:rPr lang="fr-FR" smtClean="0"/>
-              <a:t>04/07/2018</a:t>
+              <a:t>05/07/2018</a:t>
             </a:fld>
             <a:endParaRPr lang="fr-FR"/>
           </a:p>
@@ -3619,7 +3619,7 @@
           <a:p>
             <a:fld id="{F5DE3747-A71A-4323-B182-59653B97B97C}" type="datetimeFigureOut">
               <a:rPr lang="fr-FR" smtClean="0"/>
-              <a:t>04/07/2018</a:t>
+              <a:t>05/07/2018</a:t>
             </a:fld>
             <a:endParaRPr lang="fr-FR"/>
           </a:p>
@@ -3857,7 +3857,7 @@
           <a:p>
             <a:fld id="{F5DE3747-A71A-4323-B182-59653B97B97C}" type="datetimeFigureOut">
               <a:rPr lang="fr-FR" smtClean="0"/>
-              <a:t>04/07/2018</a:t>
+              <a:t>05/07/2018</a:t>
             </a:fld>
             <a:endParaRPr lang="fr-FR"/>
           </a:p>
@@ -4037,7 +4037,7 @@
           <a:p>
             <a:fld id="{F5DE3747-A71A-4323-B182-59653B97B97C}" type="datetimeFigureOut">
               <a:rPr lang="fr-FR" smtClean="0"/>
-              <a:t>04/07/2018</a:t>
+              <a:t>05/07/2018</a:t>
             </a:fld>
             <a:endParaRPr lang="fr-FR"/>
           </a:p>
@@ -4207,7 +4207,7 @@
           <a:p>
             <a:fld id="{F5DE3747-A71A-4323-B182-59653B97B97C}" type="datetimeFigureOut">
               <a:rPr lang="fr-FR" smtClean="0"/>
-              <a:t>04/07/2018</a:t>
+              <a:t>05/07/2018</a:t>
             </a:fld>
             <a:endParaRPr lang="fr-FR"/>
           </a:p>
@@ -4483,7 +4483,7 @@
           <a:p>
             <a:fld id="{F5DE3747-A71A-4323-B182-59653B97B97C}" type="datetimeFigureOut">
               <a:rPr lang="fr-FR" smtClean="0"/>
-              <a:t>04/07/2018</a:t>
+              <a:t>05/07/2018</a:t>
             </a:fld>
             <a:endParaRPr lang="fr-FR"/>
           </a:p>
@@ -5684,7 +5684,7 @@
           <a:p>
             <a:fld id="{F5DE3747-A71A-4323-B182-59653B97B97C}" type="datetimeFigureOut">
               <a:rPr lang="fr-FR" smtClean="0"/>
-              <a:t>04/07/2018</a:t>
+              <a:t>05/07/2018</a:t>
             </a:fld>
             <a:endParaRPr lang="fr-FR"/>
           </a:p>
@@ -6074,7 +6074,7 @@
           <a:p>
             <a:fld id="{F5DE3747-A71A-4323-B182-59653B97B97C}" type="datetimeFigureOut">
               <a:rPr lang="fr-FR" smtClean="0"/>
-              <a:t>04/07/2018</a:t>
+              <a:t>05/07/2018</a:t>
             </a:fld>
             <a:endParaRPr lang="fr-FR"/>
           </a:p>
@@ -6197,7 +6197,7 @@
           <a:p>
             <a:fld id="{F5DE3747-A71A-4323-B182-59653B97B97C}" type="datetimeFigureOut">
               <a:rPr lang="fr-FR" smtClean="0"/>
-              <a:t>04/07/2018</a:t>
+              <a:t>05/07/2018</a:t>
             </a:fld>
             <a:endParaRPr lang="fr-FR"/>
           </a:p>
@@ -6292,7 +6292,7 @@
           <a:p>
             <a:fld id="{F5DE3747-A71A-4323-B182-59653B97B97C}" type="datetimeFigureOut">
               <a:rPr lang="fr-FR" smtClean="0"/>
-              <a:t>04/07/2018</a:t>
+              <a:t>05/07/2018</a:t>
             </a:fld>
             <a:endParaRPr lang="fr-FR"/>
           </a:p>
@@ -7055,7 +7055,7 @@
           <a:p>
             <a:fld id="{F5DE3747-A71A-4323-B182-59653B97B97C}" type="datetimeFigureOut">
               <a:rPr lang="fr-FR" smtClean="0"/>
-              <a:t>04/07/2018</a:t>
+              <a:t>05/07/2018</a:t>
             </a:fld>
             <a:endParaRPr lang="fr-FR"/>
           </a:p>
@@ -7895,7 +7895,7 @@
           <a:p>
             <a:fld id="{F5DE3747-A71A-4323-B182-59653B97B97C}" type="datetimeFigureOut">
               <a:rPr lang="fr-FR" smtClean="0"/>
-              <a:t>04/07/2018</a:t>
+              <a:t>05/07/2018</a:t>
             </a:fld>
             <a:endParaRPr lang="fr-FR"/>
           </a:p>
@@ -8122,7 +8122,7 @@
           <a:p>
             <a:fld id="{F5DE3747-A71A-4323-B182-59653B97B97C}" type="datetimeFigureOut">
               <a:rPr lang="fr-FR" smtClean="0"/>
-              <a:t>04/07/2018</a:t>
+              <a:t>05/07/2018</a:t>
             </a:fld>
             <a:endParaRPr lang="fr-FR"/>
           </a:p>
@@ -9350,27 +9350,26 @@
           <a:p>
             <a:r>
               <a:rPr lang="fr-FR" dirty="0"/>
-              <a:t>Twitter</a:t>
+              <a:t>Amazon</a:t>
             </a:r>
           </a:p>
           <a:p>
             <a:r>
               <a:rPr lang="fr-FR" dirty="0"/>
-              <a:t>LinkedIn</a:t>
+              <a:t>Yahoo</a:t>
             </a:r>
           </a:p>
           <a:p>
             <a:r>
               <a:rPr lang="fr-FR" dirty="0"/>
-              <a:t>Facebook</a:t>
-            </a:r>
-          </a:p>
-          <a:p>
-            <a:r>
-              <a:rPr lang="fr-FR"/>
-              <a:t>Github</a:t>
-            </a:r>
-            <a:endParaRPr lang="fr-FR" dirty="0"/>
+              <a:t>Salesforce</a:t>
+            </a:r>
+          </a:p>
+          <a:p>
+            <a:r>
+              <a:rPr lang="fr-FR" dirty="0"/>
+              <a:t>…</a:t>
+            </a:r>
           </a:p>
         </p:txBody>
       </p:sp>
@@ -9384,405 +9383,6 @@
   <p:clrMapOvr>
     <a:masterClrMapping/>
   </p:clrMapOvr>
-  <p:timing>
-    <p:tnLst>
-      <p:par>
-        <p:cTn id="1" dur="indefinite" restart="never" nodeType="tmRoot">
-          <p:childTnLst>
-            <p:seq concurrent="1" nextAc="seek">
-              <p:cTn id="2" dur="indefinite" nodeType="mainSeq">
-                <p:childTnLst>
-                  <p:par>
-                    <p:cTn id="3" fill="hold">
-                      <p:stCondLst>
-                        <p:cond delay="indefinite"/>
-                      </p:stCondLst>
-                      <p:childTnLst>
-                        <p:par>
-                          <p:cTn id="4" fill="hold">
-                            <p:stCondLst>
-                              <p:cond delay="0"/>
-                            </p:stCondLst>
-                            <p:childTnLst>
-                              <p:par>
-                                <p:cTn id="5" presetID="10" presetClass="entr" presetSubtype="0" fill="hold" grpId="0" nodeType="clickEffect">
-                                  <p:stCondLst>
-                                    <p:cond delay="0"/>
-                                  </p:stCondLst>
-                                  <p:childTnLst>
-                                    <p:set>
-                                      <p:cBhvr>
-                                        <p:cTn id="6" dur="1" fill="hold">
-                                          <p:stCondLst>
-                                            <p:cond delay="0"/>
-                                          </p:stCondLst>
-                                        </p:cTn>
-                                        <p:tgtEl>
-                                          <p:spTgt spid="3">
-                                            <p:txEl>
-                                              <p:pRg st="0" end="0"/>
-                                            </p:txEl>
-                                          </p:spTgt>
-                                        </p:tgtEl>
-                                        <p:attrNameLst>
-                                          <p:attrName>style.visibility</p:attrName>
-                                        </p:attrNameLst>
-                                      </p:cBhvr>
-                                      <p:to>
-                                        <p:strVal val="visible"/>
-                                      </p:to>
-                                    </p:set>
-                                    <p:animEffect transition="in" filter="fade">
-                                      <p:cBhvr>
-                                        <p:cTn id="7" dur="500"/>
-                                        <p:tgtEl>
-                                          <p:spTgt spid="3">
-                                            <p:txEl>
-                                              <p:pRg st="0" end="0"/>
-                                            </p:txEl>
-                                          </p:spTgt>
-                                        </p:tgtEl>
-                                      </p:cBhvr>
-                                    </p:animEffect>
-                                  </p:childTnLst>
-                                </p:cTn>
-                              </p:par>
-                            </p:childTnLst>
-                          </p:cTn>
-                        </p:par>
-                      </p:childTnLst>
-                    </p:cTn>
-                  </p:par>
-                  <p:par>
-                    <p:cTn id="8" fill="hold">
-                      <p:stCondLst>
-                        <p:cond delay="indefinite"/>
-                      </p:stCondLst>
-                      <p:childTnLst>
-                        <p:par>
-                          <p:cTn id="9" fill="hold">
-                            <p:stCondLst>
-                              <p:cond delay="0"/>
-                            </p:stCondLst>
-                            <p:childTnLst>
-                              <p:par>
-                                <p:cTn id="10" presetID="10" presetClass="entr" presetSubtype="0" fill="hold" grpId="0" nodeType="clickEffect">
-                                  <p:stCondLst>
-                                    <p:cond delay="0"/>
-                                  </p:stCondLst>
-                                  <p:childTnLst>
-                                    <p:set>
-                                      <p:cBhvr>
-                                        <p:cTn id="11" dur="1" fill="hold">
-                                          <p:stCondLst>
-                                            <p:cond delay="0"/>
-                                          </p:stCondLst>
-                                        </p:cTn>
-                                        <p:tgtEl>
-                                          <p:spTgt spid="3">
-                                            <p:txEl>
-                                              <p:pRg st="1" end="1"/>
-                                            </p:txEl>
-                                          </p:spTgt>
-                                        </p:tgtEl>
-                                        <p:attrNameLst>
-                                          <p:attrName>style.visibility</p:attrName>
-                                        </p:attrNameLst>
-                                      </p:cBhvr>
-                                      <p:to>
-                                        <p:strVal val="visible"/>
-                                      </p:to>
-                                    </p:set>
-                                    <p:animEffect transition="in" filter="fade">
-                                      <p:cBhvr>
-                                        <p:cTn id="12" dur="500"/>
-                                        <p:tgtEl>
-                                          <p:spTgt spid="3">
-                                            <p:txEl>
-                                              <p:pRg st="1" end="1"/>
-                                            </p:txEl>
-                                          </p:spTgt>
-                                        </p:tgtEl>
-                                      </p:cBhvr>
-                                    </p:animEffect>
-                                  </p:childTnLst>
-                                </p:cTn>
-                              </p:par>
-                            </p:childTnLst>
-                          </p:cTn>
-                        </p:par>
-                      </p:childTnLst>
-                    </p:cTn>
-                  </p:par>
-                  <p:par>
-                    <p:cTn id="13" fill="hold">
-                      <p:stCondLst>
-                        <p:cond delay="indefinite"/>
-                      </p:stCondLst>
-                      <p:childTnLst>
-                        <p:par>
-                          <p:cTn id="14" fill="hold">
-                            <p:stCondLst>
-                              <p:cond delay="0"/>
-                            </p:stCondLst>
-                            <p:childTnLst>
-                              <p:par>
-                                <p:cTn id="15" presetID="10" presetClass="entr" presetSubtype="0" fill="hold" grpId="0" nodeType="clickEffect">
-                                  <p:stCondLst>
-                                    <p:cond delay="0"/>
-                                  </p:stCondLst>
-                                  <p:childTnLst>
-                                    <p:set>
-                                      <p:cBhvr>
-                                        <p:cTn id="16" dur="1" fill="hold">
-                                          <p:stCondLst>
-                                            <p:cond delay="0"/>
-                                          </p:stCondLst>
-                                        </p:cTn>
-                                        <p:tgtEl>
-                                          <p:spTgt spid="3">
-                                            <p:txEl>
-                                              <p:pRg st="2" end="2"/>
-                                            </p:txEl>
-                                          </p:spTgt>
-                                        </p:tgtEl>
-                                        <p:attrNameLst>
-                                          <p:attrName>style.visibility</p:attrName>
-                                        </p:attrNameLst>
-                                      </p:cBhvr>
-                                      <p:to>
-                                        <p:strVal val="visible"/>
-                                      </p:to>
-                                    </p:set>
-                                    <p:animEffect transition="in" filter="fade">
-                                      <p:cBhvr>
-                                        <p:cTn id="17" dur="500"/>
-                                        <p:tgtEl>
-                                          <p:spTgt spid="3">
-                                            <p:txEl>
-                                              <p:pRg st="2" end="2"/>
-                                            </p:txEl>
-                                          </p:spTgt>
-                                        </p:tgtEl>
-                                      </p:cBhvr>
-                                    </p:animEffect>
-                                  </p:childTnLst>
-                                </p:cTn>
-                              </p:par>
-                            </p:childTnLst>
-                          </p:cTn>
-                        </p:par>
-                      </p:childTnLst>
-                    </p:cTn>
-                  </p:par>
-                  <p:par>
-                    <p:cTn id="18" fill="hold">
-                      <p:stCondLst>
-                        <p:cond delay="indefinite"/>
-                      </p:stCondLst>
-                      <p:childTnLst>
-                        <p:par>
-                          <p:cTn id="19" fill="hold">
-                            <p:stCondLst>
-                              <p:cond delay="0"/>
-                            </p:stCondLst>
-                            <p:childTnLst>
-                              <p:par>
-                                <p:cTn id="20" presetID="10" presetClass="entr" presetSubtype="0" fill="hold" grpId="0" nodeType="clickEffect">
-                                  <p:stCondLst>
-                                    <p:cond delay="0"/>
-                                  </p:stCondLst>
-                                  <p:childTnLst>
-                                    <p:set>
-                                      <p:cBhvr>
-                                        <p:cTn id="21" dur="1" fill="hold">
-                                          <p:stCondLst>
-                                            <p:cond delay="0"/>
-                                          </p:stCondLst>
-                                        </p:cTn>
-                                        <p:tgtEl>
-                                          <p:spTgt spid="3">
-                                            <p:txEl>
-                                              <p:pRg st="3" end="3"/>
-                                            </p:txEl>
-                                          </p:spTgt>
-                                        </p:tgtEl>
-                                        <p:attrNameLst>
-                                          <p:attrName>style.visibility</p:attrName>
-                                        </p:attrNameLst>
-                                      </p:cBhvr>
-                                      <p:to>
-                                        <p:strVal val="visible"/>
-                                      </p:to>
-                                    </p:set>
-                                    <p:animEffect transition="in" filter="fade">
-                                      <p:cBhvr>
-                                        <p:cTn id="22" dur="500"/>
-                                        <p:tgtEl>
-                                          <p:spTgt spid="3">
-                                            <p:txEl>
-                                              <p:pRg st="3" end="3"/>
-                                            </p:txEl>
-                                          </p:spTgt>
-                                        </p:tgtEl>
-                                      </p:cBhvr>
-                                    </p:animEffect>
-                                  </p:childTnLst>
-                                </p:cTn>
-                              </p:par>
-                            </p:childTnLst>
-                          </p:cTn>
-                        </p:par>
-                      </p:childTnLst>
-                    </p:cTn>
-                  </p:par>
-                  <p:par>
-                    <p:cTn id="23" fill="hold">
-                      <p:stCondLst>
-                        <p:cond delay="indefinite"/>
-                      </p:stCondLst>
-                      <p:childTnLst>
-                        <p:par>
-                          <p:cTn id="24" fill="hold">
-                            <p:stCondLst>
-                              <p:cond delay="0"/>
-                            </p:stCondLst>
-                            <p:childTnLst>
-                              <p:par>
-                                <p:cTn id="25" presetID="10" presetClass="entr" presetSubtype="0" fill="hold" grpId="0" nodeType="clickEffect">
-                                  <p:stCondLst>
-                                    <p:cond delay="0"/>
-                                  </p:stCondLst>
-                                  <p:childTnLst>
-                                    <p:set>
-                                      <p:cBhvr>
-                                        <p:cTn id="26" dur="1" fill="hold">
-                                          <p:stCondLst>
-                                            <p:cond delay="0"/>
-                                          </p:stCondLst>
-                                        </p:cTn>
-                                        <p:tgtEl>
-                                          <p:spTgt spid="3">
-                                            <p:txEl>
-                                              <p:pRg st="4" end="4"/>
-                                            </p:txEl>
-                                          </p:spTgt>
-                                        </p:tgtEl>
-                                        <p:attrNameLst>
-                                          <p:attrName>style.visibility</p:attrName>
-                                        </p:attrNameLst>
-                                      </p:cBhvr>
-                                      <p:to>
-                                        <p:strVal val="visible"/>
-                                      </p:to>
-                                    </p:set>
-                                    <p:animEffect transition="in" filter="fade">
-                                      <p:cBhvr>
-                                        <p:cTn id="27" dur="500"/>
-                                        <p:tgtEl>
-                                          <p:spTgt spid="3">
-                                            <p:txEl>
-                                              <p:pRg st="4" end="4"/>
-                                            </p:txEl>
-                                          </p:spTgt>
-                                        </p:tgtEl>
-                                      </p:cBhvr>
-                                    </p:animEffect>
-                                  </p:childTnLst>
-                                </p:cTn>
-                              </p:par>
-                            </p:childTnLst>
-                          </p:cTn>
-                        </p:par>
-                      </p:childTnLst>
-                    </p:cTn>
-                  </p:par>
-                  <p:par>
-                    <p:cTn id="28" fill="hold">
-                      <p:stCondLst>
-                        <p:cond delay="indefinite"/>
-                      </p:stCondLst>
-                      <p:childTnLst>
-                        <p:par>
-                          <p:cTn id="29" fill="hold">
-                            <p:stCondLst>
-                              <p:cond delay="0"/>
-                            </p:stCondLst>
-                            <p:childTnLst>
-                              <p:par>
-                                <p:cTn id="30" presetID="10" presetClass="entr" presetSubtype="0" fill="hold" grpId="0" nodeType="clickEffect">
-                                  <p:stCondLst>
-                                    <p:cond delay="0"/>
-                                  </p:stCondLst>
-                                  <p:childTnLst>
-                                    <p:set>
-                                      <p:cBhvr>
-                                        <p:cTn id="31" dur="1" fill="hold">
-                                          <p:stCondLst>
-                                            <p:cond delay="0"/>
-                                          </p:stCondLst>
-                                        </p:cTn>
-                                        <p:tgtEl>
-                                          <p:spTgt spid="3">
-                                            <p:txEl>
-                                              <p:pRg st="5" end="5"/>
-                                            </p:txEl>
-                                          </p:spTgt>
-                                        </p:tgtEl>
-                                        <p:attrNameLst>
-                                          <p:attrName>style.visibility</p:attrName>
-                                        </p:attrNameLst>
-                                      </p:cBhvr>
-                                      <p:to>
-                                        <p:strVal val="visible"/>
-                                      </p:to>
-                                    </p:set>
-                                    <p:animEffect transition="in" filter="fade">
-                                      <p:cBhvr>
-                                        <p:cTn id="32" dur="500"/>
-                                        <p:tgtEl>
-                                          <p:spTgt spid="3">
-                                            <p:txEl>
-                                              <p:pRg st="5" end="5"/>
-                                            </p:txEl>
-                                          </p:spTgt>
-                                        </p:tgtEl>
-                                      </p:cBhvr>
-                                    </p:animEffect>
-                                  </p:childTnLst>
-                                </p:cTn>
-                              </p:par>
-                            </p:childTnLst>
-                          </p:cTn>
-                        </p:par>
-                      </p:childTnLst>
-                    </p:cTn>
-                  </p:par>
-                </p:childTnLst>
-              </p:cTn>
-              <p:prevCondLst>
-                <p:cond evt="onPrev" delay="0">
-                  <p:tgtEl>
-                    <p:sldTgt/>
-                  </p:tgtEl>
-                </p:cond>
-              </p:prevCondLst>
-              <p:nextCondLst>
-                <p:cond evt="onNext" delay="0">
-                  <p:tgtEl>
-                    <p:sldTgt/>
-                  </p:tgtEl>
-                </p:cond>
-              </p:nextCondLst>
-            </p:seq>
-          </p:childTnLst>
-        </p:cTn>
-      </p:par>
-    </p:tnLst>
-    <p:bldLst>
-      <p:bldP spid="3" grpId="0" build="p"/>
-    </p:bldLst>
-  </p:timing>
 </p:sld>
 </file>
 

</xml_diff>